<commit_message>
added BOS passenger type
</commit_message>
<xml_diff>
--- a/backend/templates/ticket_template_oneway.pptx
+++ b/backend/templates/ticket_template_oneway.pptx
@@ -243,7 +243,7 @@
           <a:p>
             <a:fld id="{9AE5AEBF-C5F5-4C8B-8293-61D24E0D515D}" type="datetimeFigureOut">
               <a:rPr lang="en-US" smtClean="0"/>
-              <a:t>12/23/2025</a:t>
+              <a:t>12/29/2025</a:t>
             </a:fld>
             <a:endParaRPr lang="en-US"/>
           </a:p>
@@ -413,7 +413,7 @@
           <a:p>
             <a:fld id="{9AE5AEBF-C5F5-4C8B-8293-61D24E0D515D}" type="datetimeFigureOut">
               <a:rPr lang="en-US" smtClean="0"/>
-              <a:t>12/23/2025</a:t>
+              <a:t>12/29/2025</a:t>
             </a:fld>
             <a:endParaRPr lang="en-US"/>
           </a:p>
@@ -593,7 +593,7 @@
           <a:p>
             <a:fld id="{9AE5AEBF-C5F5-4C8B-8293-61D24E0D515D}" type="datetimeFigureOut">
               <a:rPr lang="en-US" smtClean="0"/>
-              <a:t>12/23/2025</a:t>
+              <a:t>12/29/2025</a:t>
             </a:fld>
             <a:endParaRPr lang="en-US"/>
           </a:p>
@@ -763,7 +763,7 @@
           <a:p>
             <a:fld id="{9AE5AEBF-C5F5-4C8B-8293-61D24E0D515D}" type="datetimeFigureOut">
               <a:rPr lang="en-US" smtClean="0"/>
-              <a:t>12/23/2025</a:t>
+              <a:t>12/29/2025</a:t>
             </a:fld>
             <a:endParaRPr lang="en-US"/>
           </a:p>
@@ -1009,7 +1009,7 @@
           <a:p>
             <a:fld id="{9AE5AEBF-C5F5-4C8B-8293-61D24E0D515D}" type="datetimeFigureOut">
               <a:rPr lang="en-US" smtClean="0"/>
-              <a:t>12/23/2025</a:t>
+              <a:t>12/29/2025</a:t>
             </a:fld>
             <a:endParaRPr lang="en-US"/>
           </a:p>
@@ -1241,7 +1241,7 @@
           <a:p>
             <a:fld id="{9AE5AEBF-C5F5-4C8B-8293-61D24E0D515D}" type="datetimeFigureOut">
               <a:rPr lang="en-US" smtClean="0"/>
-              <a:t>12/23/2025</a:t>
+              <a:t>12/29/2025</a:t>
             </a:fld>
             <a:endParaRPr lang="en-US"/>
           </a:p>
@@ -1608,7 +1608,7 @@
           <a:p>
             <a:fld id="{9AE5AEBF-C5F5-4C8B-8293-61D24E0D515D}" type="datetimeFigureOut">
               <a:rPr lang="en-US" smtClean="0"/>
-              <a:t>12/23/2025</a:t>
+              <a:t>12/29/2025</a:t>
             </a:fld>
             <a:endParaRPr lang="en-US"/>
           </a:p>
@@ -1726,7 +1726,7 @@
           <a:p>
             <a:fld id="{9AE5AEBF-C5F5-4C8B-8293-61D24E0D515D}" type="datetimeFigureOut">
               <a:rPr lang="en-US" smtClean="0"/>
-              <a:t>12/23/2025</a:t>
+              <a:t>12/29/2025</a:t>
             </a:fld>
             <a:endParaRPr lang="en-US"/>
           </a:p>
@@ -1821,7 +1821,7 @@
           <a:p>
             <a:fld id="{9AE5AEBF-C5F5-4C8B-8293-61D24E0D515D}" type="datetimeFigureOut">
               <a:rPr lang="en-US" smtClean="0"/>
-              <a:t>12/23/2025</a:t>
+              <a:t>12/29/2025</a:t>
             </a:fld>
             <a:endParaRPr lang="en-US"/>
           </a:p>
@@ -2098,7 +2098,7 @@
           <a:p>
             <a:fld id="{9AE5AEBF-C5F5-4C8B-8293-61D24E0D515D}" type="datetimeFigureOut">
               <a:rPr lang="en-US" smtClean="0"/>
-              <a:t>12/23/2025</a:t>
+              <a:t>12/29/2025</a:t>
             </a:fld>
             <a:endParaRPr lang="en-US"/>
           </a:p>
@@ -2355,7 +2355,7 @@
           <a:p>
             <a:fld id="{9AE5AEBF-C5F5-4C8B-8293-61D24E0D515D}" type="datetimeFigureOut">
               <a:rPr lang="en-US" smtClean="0"/>
-              <a:t>12/23/2025</a:t>
+              <a:t>12/29/2025</a:t>
             </a:fld>
             <a:endParaRPr lang="en-US"/>
           </a:p>
@@ -2568,7 +2568,7 @@
           <a:p>
             <a:fld id="{9AE5AEBF-C5F5-4C8B-8293-61D24E0D515D}" type="datetimeFigureOut">
               <a:rPr lang="en-US" smtClean="0"/>
-              <a:t>12/23/2025</a:t>
+              <a:t>12/29/2025</a:t>
             </a:fld>
             <a:endParaRPr lang="en-US"/>
           </a:p>
@@ -3250,7 +3250,7 @@
                 <a:latin typeface="Arial" panose="020B0604020202020204" pitchFamily="34" charset="0"/>
                 <a:cs typeface="Arial" panose="020B0604020202020204" pitchFamily="34" charset="0"/>
               </a:rPr>
-              <a:t>TEL. 02-2666-0849 | FAX </a:t>
+              <a:t>TEL. 02-2666-0847 | FAX </a:t>
             </a:r>
             <a:r>
               <a:rPr lang="en-US" sz="1100" dirty="0">
@@ -3276,8 +3276,8 @@
         </p:nvSpPr>
         <p:spPr>
           <a:xfrm>
-            <a:off x="5090712" y="1977418"/>
-            <a:ext cx="1634335" cy="253916"/>
+            <a:off x="4841214" y="1977418"/>
+            <a:ext cx="1883833" cy="253916"/>
           </a:xfrm>
           <a:prstGeom prst="rect">
             <a:avLst/>
@@ -3291,18 +3291,11 @@
           <a:lstStyle/>
           <a:p>
             <a:r>
-              <a:rPr lang="en-US" sz="1050">
-                <a:latin typeface="Arial" panose="020B0604020202020204" pitchFamily="34" charset="0"/>
-                <a:cs typeface="Arial" panose="020B0604020202020204" pitchFamily="34" charset="0"/>
-              </a:rPr>
-              <a:t>https://korbang.</a:t>
-            </a:r>
-            <a:r>
               <a:rPr lang="en-US" sz="1050" dirty="0">
                 <a:latin typeface="Arial" panose="020B0604020202020204" pitchFamily="34" charset="0"/>
                 <a:cs typeface="Arial" panose="020B0604020202020204" pitchFamily="34" charset="0"/>
               </a:rPr>
-              <a:t>com</a:t>
+              <a:t>https://www.korbang.com</a:t>
             </a:r>
             <a:endParaRPr lang="en-US" sz="1200" dirty="0">
               <a:latin typeface="Arial" panose="020B0604020202020204" pitchFamily="34" charset="0"/>
@@ -4116,7 +4109,7 @@
                 <a:latin typeface="Arial" panose="020B0604020202020204" pitchFamily="34" charset="0"/>
                 <a:cs typeface="Arial" panose="020B0604020202020204" pitchFamily="34" charset="0"/>
               </a:rPr>
-              <a:t>Check in Luggage: 23kg + 23kg</a:t>
+              <a:t>Check in Luggage: {{luggage}}</a:t>
             </a:r>
           </a:p>
         </p:txBody>
@@ -4717,7 +4710,7 @@
         </p:nvSpPr>
         <p:spPr>
           <a:xfrm>
-            <a:off x="2163609" y="2537691"/>
+            <a:off x="2189009" y="2537691"/>
             <a:ext cx="1219192" cy="276999"/>
           </a:xfrm>
           <a:prstGeom prst="rect">
@@ -4788,7 +4781,21 @@
                 <a:latin typeface="Arial" panose="020B0604020202020204" pitchFamily="34" charset="0"/>
                 <a:cs typeface="Arial" panose="020B0604020202020204" pitchFamily="34" charset="0"/>
               </a:rPr>
-              <a:t>* This Ticket is issued by Airline Chater Operator</a:t>
+              <a:t>* This Ticket is issued by </a:t>
+            </a:r>
+            <a:r>
+              <a:rPr lang="en-US" sz="1050">
+                <a:latin typeface="Arial" panose="020B0604020202020204" pitchFamily="34" charset="0"/>
+                <a:cs typeface="Arial" panose="020B0604020202020204" pitchFamily="34" charset="0"/>
+              </a:rPr>
+              <a:t>Airline Charter </a:t>
+            </a:r>
+            <a:r>
+              <a:rPr lang="en-US" sz="1050" dirty="0">
+                <a:latin typeface="Arial" panose="020B0604020202020204" pitchFamily="34" charset="0"/>
+                <a:cs typeface="Arial" panose="020B0604020202020204" pitchFamily="34" charset="0"/>
+              </a:rPr>
+              <a:t>Operator</a:t>
             </a:r>
             <a:endParaRPr lang="en-US" sz="1600" dirty="0">
               <a:latin typeface="Arial" panose="020B0604020202020204" pitchFamily="34" charset="0"/>

</xml_diff>